<commit_message>
KBLFRM-928: Instantiation of Topologies.
</commit_message>
<xml_diff>
--- a/vec/models/contact-points.pptx
+++ b/vec/models/contact-points.pptx
@@ -4095,7 +4095,7 @@
           </a:prstGeom>
           <a:ln w="47625">
             <a:solidFill>
-              <a:srgbClr val="FF0000"/>
+              <a:srgbClr val="FFC000"/>
             </a:solidFill>
             <a:tailEnd type="triangle"/>
           </a:ln>
@@ -4613,7 +4613,7 @@
           </a:prstGeom>
           <a:ln w="47625">
             <a:solidFill>
-              <a:srgbClr val="FF0000"/>
+              <a:srgbClr val="FFC000"/>
             </a:solidFill>
             <a:tailEnd type="triangle"/>
           </a:ln>

</xml_diff>